<commit_message>
adding more comments to network.go, updating golang3 powerpoint.
</commit_message>
<xml_diff>
--- a/assets/powerpoints/golang3.pptx
+++ b/assets/powerpoints/golang3.pptx
@@ -216,7 +216,7 @@
           <a:p>
             <a:fld id="{AB412791-CB19-4B63-9963-8A77FB30904D}" type="datetimeFigureOut">
               <a:rPr lang="en-US" smtClean="0"/>
-              <a:t>5/17/2019</a:t>
+              <a:t>5/18/2019</a:t>
             </a:fld>
             <a:endParaRPr lang="en-US"/>
           </a:p>
@@ -558,7 +558,11 @@
             </a:r>
             <a:r>
               <a:rPr lang="en-US" baseline="0" dirty="0" smtClean="0"/>
-              <a:t>.</a:t>
+              <a:t>, and </a:t>
+            </a:r>
+            <a:r>
+              <a:rPr lang="en-US" baseline="0" dirty="0" err="1" smtClean="0"/>
+              <a:t>gobuffalo</a:t>
             </a:r>
             <a:endParaRPr lang="en-US" dirty="0"/>
           </a:p>
@@ -1367,13 +1371,20 @@
             </a:r>
           </a:p>
           <a:p>
+            <a:endParaRPr lang="en-US" dirty="0" smtClean="0"/>
+          </a:p>
+          <a:p>
             <a:r>
               <a:rPr lang="en-US" dirty="0" smtClean="0"/>
               <a:t>With</a:t>
             </a:r>
             <a:r>
               <a:rPr lang="en-US" baseline="0" dirty="0" smtClean="0"/>
-              <a:t> this I wanted to talk about the verdict of if I would choose to use </a:t>
+              <a:t> </a:t>
+            </a:r>
+            <a:r>
+              <a:rPr lang="en-US" baseline="0" dirty="0" smtClean="0"/>
+              <a:t>this I wanted to talk about the verdict of if I would choose to use </a:t>
             </a:r>
             <a:r>
               <a:rPr lang="en-US" baseline="0" dirty="0" err="1" smtClean="0"/>
@@ -1419,21 +1430,22 @@
               <a:rPr lang="en-US" baseline="0" dirty="0" smtClean="0">
                 <a:latin typeface="Roboto"/>
               </a:rPr>
-              <a:t>, swift, or OBJ C. no because of limited support for this library.</a:t>
-            </a:r>
-          </a:p>
-          <a:p>
+              <a:t>, swift, or OBJ C. no because of limited support for this library</a:t>
+            </a:r>
             <a:r>
               <a:rPr lang="en-US" baseline="0" dirty="0" smtClean="0">
                 <a:latin typeface="Roboto"/>
               </a:rPr>
-              <a:t> </a:t>
-            </a:r>
-            <a:endParaRPr lang="en-US" dirty="0" smtClean="0">
-              <a:latin typeface="Roboto"/>
-            </a:endParaRPr>
-          </a:p>
-          <a:p>
+              <a:t>.</a:t>
+            </a:r>
+          </a:p>
+          <a:p>
+            <a:r>
+              <a:rPr lang="en-US" baseline="0" dirty="0" smtClean="0">
+                <a:latin typeface="Roboto"/>
+              </a:rPr>
+              <a:t>Currently its only been 4 years in development and the last update to the code base was 2months ago.</a:t>
+            </a:r>
             <a:endParaRPr lang="en-US" dirty="0" smtClean="0"/>
           </a:p>
           <a:p>
@@ -1539,13 +1551,105 @@
             </a:r>
             <a:r>
               <a:rPr lang="en-US" baseline="0" dirty="0" smtClean="0"/>
-              <a:t> language and is used for rapid web development.</a:t>
-            </a:r>
-          </a:p>
-          <a:p>
+              <a:t> language and is used for rapid web development</a:t>
+            </a:r>
             <a:r>
               <a:rPr lang="en-US" baseline="0" dirty="0" smtClean="0"/>
-              <a:t>-</a:t>
+              <a:t>.</a:t>
+            </a:r>
+          </a:p>
+          <a:p>
+            <a:r>
+              <a:rPr lang="en-US" baseline="0" dirty="0" smtClean="0"/>
+              <a:t>-To generate a new buffalo project, run the `buffalo new (name of site)` cmd.</a:t>
+            </a:r>
+          </a:p>
+          <a:p>
+            <a:r>
+              <a:rPr lang="en-US" baseline="0" dirty="0" smtClean="0"/>
+              <a:t>-Running the buffalo dev </a:t>
+            </a:r>
+            <a:r>
+              <a:rPr lang="en-US" baseline="0" dirty="0" err="1" smtClean="0"/>
+              <a:t>cmd</a:t>
+            </a:r>
+            <a:r>
+              <a:rPr lang="en-US" baseline="0" dirty="0" smtClean="0"/>
+              <a:t> starts the server on a default port.</a:t>
+            </a:r>
+            <a:endParaRPr lang="en-US" baseline="0" dirty="0" smtClean="0"/>
+          </a:p>
+          <a:p>
+            <a:r>
+              <a:rPr lang="en-US" baseline="0" dirty="0" smtClean="0"/>
+              <a:t>-Actions is a directory where all of you go code goes, inside an action file is a mapping of an http verb(</a:t>
+            </a:r>
+            <a:r>
+              <a:rPr lang="en-US" baseline="0" dirty="0" err="1" smtClean="0"/>
+              <a:t>get,put,post</a:t>
+            </a:r>
+            <a:r>
+              <a:rPr lang="en-US" baseline="0" dirty="0" smtClean="0"/>
+              <a:t>), a route, and a handler </a:t>
+            </a:r>
+          </a:p>
+          <a:p>
+            <a:r>
+              <a:rPr lang="en-US" baseline="0" dirty="0" smtClean="0"/>
+              <a:t>-Templates is the directory where all of your html goes. </a:t>
+            </a:r>
+            <a:endParaRPr lang="en-US" baseline="0" dirty="0" smtClean="0"/>
+          </a:p>
+          <a:p>
+            <a:r>
+              <a:rPr lang="en-US" baseline="0" dirty="0" smtClean="0"/>
+              <a:t> </a:t>
+            </a:r>
+            <a:endParaRPr lang="en-US" baseline="0" dirty="0" smtClean="0"/>
+          </a:p>
+          <a:p>
+            <a:pPr marL="0" marR="0" lvl="0" indent="0" algn="l" defTabSz="914400" rtl="0" eaLnBrk="1" fontAlgn="auto" latinLnBrk="0" hangingPunct="1">
+              <a:lnSpc>
+                <a:spcPct val="100000"/>
+              </a:lnSpc>
+              <a:spcBef>
+                <a:spcPts val="0"/>
+              </a:spcBef>
+              <a:spcAft>
+                <a:spcPts val="0"/>
+              </a:spcAft>
+              <a:buClrTx/>
+              <a:buSzTx/>
+              <a:buFontTx/>
+              <a:buNone/>
+              <a:tabLst/>
+              <a:defRPr/>
+            </a:pPr>
+            <a:r>
+              <a:rPr lang="en-US" baseline="0" dirty="0" smtClean="0"/>
+              <a:t>-buffalo </a:t>
+            </a:r>
+            <a:r>
+              <a:rPr lang="en-US" baseline="0" dirty="0" err="1" smtClean="0"/>
+              <a:t>db</a:t>
+            </a:r>
+            <a:r>
+              <a:rPr lang="en-US" baseline="0" dirty="0" smtClean="0"/>
+              <a:t> create –a: this will create the databases defined in the </a:t>
+            </a:r>
+            <a:r>
+              <a:rPr lang="en-US" baseline="0" dirty="0" err="1" smtClean="0"/>
+              <a:t>database.yml</a:t>
+            </a:r>
+            <a:r>
+              <a:rPr lang="en-US" baseline="0" dirty="0" smtClean="0"/>
+              <a:t> file</a:t>
+            </a:r>
+          </a:p>
+          <a:p>
+            <a:r>
+              <a:rPr lang="en-US" baseline="0" dirty="0" smtClean="0"/>
+              <a:t>-buffalo dev: to run the buffalo app in dev mode.</a:t>
             </a:r>
           </a:p>
           <a:p>
@@ -1808,7 +1912,7 @@
           <a:p>
             <a:fld id="{790ED757-B5C7-4A40-922E-B631E1D33579}" type="datetimeFigureOut">
               <a:rPr lang="en-US" smtClean="0"/>
-              <a:t>5/17/2019</a:t>
+              <a:t>5/18/2019</a:t>
             </a:fld>
             <a:endParaRPr lang="en-US"/>
           </a:p>
@@ -1978,7 +2082,7 @@
           <a:p>
             <a:fld id="{790ED757-B5C7-4A40-922E-B631E1D33579}" type="datetimeFigureOut">
               <a:rPr lang="en-US" smtClean="0"/>
-              <a:t>5/17/2019</a:t>
+              <a:t>5/18/2019</a:t>
             </a:fld>
             <a:endParaRPr lang="en-US"/>
           </a:p>
@@ -2158,7 +2262,7 @@
           <a:p>
             <a:fld id="{790ED757-B5C7-4A40-922E-B631E1D33579}" type="datetimeFigureOut">
               <a:rPr lang="en-US" smtClean="0"/>
-              <a:t>5/17/2019</a:t>
+              <a:t>5/18/2019</a:t>
             </a:fld>
             <a:endParaRPr lang="en-US"/>
           </a:p>
@@ -2328,7 +2432,7 @@
           <a:p>
             <a:fld id="{790ED757-B5C7-4A40-922E-B631E1D33579}" type="datetimeFigureOut">
               <a:rPr lang="en-US" smtClean="0"/>
-              <a:t>5/17/2019</a:t>
+              <a:t>5/18/2019</a:t>
             </a:fld>
             <a:endParaRPr lang="en-US"/>
           </a:p>
@@ -2574,7 +2678,7 @@
           <a:p>
             <a:fld id="{790ED757-B5C7-4A40-922E-B631E1D33579}" type="datetimeFigureOut">
               <a:rPr lang="en-US" smtClean="0"/>
-              <a:t>5/17/2019</a:t>
+              <a:t>5/18/2019</a:t>
             </a:fld>
             <a:endParaRPr lang="en-US"/>
           </a:p>
@@ -2806,7 +2910,7 @@
           <a:p>
             <a:fld id="{790ED757-B5C7-4A40-922E-B631E1D33579}" type="datetimeFigureOut">
               <a:rPr lang="en-US" smtClean="0"/>
-              <a:t>5/17/2019</a:t>
+              <a:t>5/18/2019</a:t>
             </a:fld>
             <a:endParaRPr lang="en-US"/>
           </a:p>
@@ -3173,7 +3277,7 @@
           <a:p>
             <a:fld id="{790ED757-B5C7-4A40-922E-B631E1D33579}" type="datetimeFigureOut">
               <a:rPr lang="en-US" smtClean="0"/>
-              <a:t>5/17/2019</a:t>
+              <a:t>5/18/2019</a:t>
             </a:fld>
             <a:endParaRPr lang="en-US"/>
           </a:p>
@@ -3291,7 +3395,7 @@
           <a:p>
             <a:fld id="{790ED757-B5C7-4A40-922E-B631E1D33579}" type="datetimeFigureOut">
               <a:rPr lang="en-US" smtClean="0"/>
-              <a:t>5/17/2019</a:t>
+              <a:t>5/18/2019</a:t>
             </a:fld>
             <a:endParaRPr lang="en-US"/>
           </a:p>
@@ -3386,7 +3490,7 @@
           <a:p>
             <a:fld id="{790ED757-B5C7-4A40-922E-B631E1D33579}" type="datetimeFigureOut">
               <a:rPr lang="en-US" smtClean="0"/>
-              <a:t>5/17/2019</a:t>
+              <a:t>5/18/2019</a:t>
             </a:fld>
             <a:endParaRPr lang="en-US"/>
           </a:p>
@@ -3663,7 +3767,7 @@
           <a:p>
             <a:fld id="{790ED757-B5C7-4A40-922E-B631E1D33579}" type="datetimeFigureOut">
               <a:rPr lang="en-US" smtClean="0"/>
-              <a:t>5/17/2019</a:t>
+              <a:t>5/18/2019</a:t>
             </a:fld>
             <a:endParaRPr lang="en-US"/>
           </a:p>
@@ -3916,7 +4020,7 @@
           <a:p>
             <a:fld id="{790ED757-B5C7-4A40-922E-B631E1D33579}" type="datetimeFigureOut">
               <a:rPr lang="en-US" smtClean="0"/>
-              <a:t>5/17/2019</a:t>
+              <a:t>5/18/2019</a:t>
             </a:fld>
             <a:endParaRPr lang="en-US"/>
           </a:p>
@@ -4129,7 +4233,7 @@
           <a:p>
             <a:fld id="{790ED757-B5C7-4A40-922E-B631E1D33579}" type="datetimeFigureOut">
               <a:rPr lang="en-US" smtClean="0"/>
-              <a:t>5/17/2019</a:t>
+              <a:t>5/18/2019</a:t>
             </a:fld>
             <a:endParaRPr lang="en-US"/>
           </a:p>
@@ -5610,13 +5714,23 @@
             </a:r>
           </a:p>
           <a:p>
-            <a:pPr lvl="8"/>
             <a:r>
               <a:rPr lang="en-US" dirty="0" smtClean="0"/>
-              <a:t>Commands/Flags</a:t>
-            </a:r>
-          </a:p>
-          <a:p>
+              <a:t>Actions</a:t>
+            </a:r>
+          </a:p>
+          <a:p>
+            <a:r>
+              <a:rPr lang="en-US" dirty="0" smtClean="0"/>
+              <a:t>Templates </a:t>
+            </a:r>
+            <a:endParaRPr lang="en-US" dirty="0" smtClean="0"/>
+          </a:p>
+          <a:p>
+            <a:r>
+              <a:rPr lang="en-US" dirty="0" smtClean="0"/>
+              <a:t>Demoing </a:t>
+            </a:r>
             <a:r>
               <a:rPr lang="en-US" dirty="0" err="1" smtClean="0"/>
               <a:t>GameOfBuffalo</a:t>
@@ -5644,8 +5758,8 @@
         </p:blipFill>
         <p:spPr>
           <a:xfrm>
-            <a:off x="4710596" y="2579841"/>
-            <a:ext cx="7481404" cy="4278159"/>
+            <a:off x="5420299" y="2579841"/>
+            <a:ext cx="6771701" cy="4278159"/>
           </a:xfrm>
           <a:prstGeom prst="rect">
             <a:avLst/>

</xml_diff>

<commit_message>
Adding more to to gameofbuffalo
</commit_message>
<xml_diff>
--- a/assets/powerpoints/golang3.pptx
+++ b/assets/powerpoints/golang3.pptx
@@ -216,7 +216,7 @@
           <a:p>
             <a:fld id="{AB412791-CB19-4B63-9963-8A77FB30904D}" type="datetimeFigureOut">
               <a:rPr lang="en-US" smtClean="0"/>
-              <a:t>5/18/2019</a:t>
+              <a:t>5/19/2019</a:t>
             </a:fld>
             <a:endParaRPr lang="en-US"/>
           </a:p>
@@ -1380,11 +1380,7 @@
             </a:r>
             <a:r>
               <a:rPr lang="en-US" baseline="0" dirty="0" smtClean="0"/>
-              <a:t> </a:t>
-            </a:r>
-            <a:r>
-              <a:rPr lang="en-US" baseline="0" dirty="0" smtClean="0"/>
-              <a:t>this I wanted to talk about the verdict of if I would choose to use </a:t>
+              <a:t> this I wanted to talk about the verdict of if I would choose to use </a:t>
             </a:r>
             <a:r>
               <a:rPr lang="en-US" baseline="0" dirty="0" err="1" smtClean="0"/>
@@ -1430,13 +1426,7 @@
               <a:rPr lang="en-US" baseline="0" dirty="0" smtClean="0">
                 <a:latin typeface="Roboto"/>
               </a:rPr>
-              <a:t>, swift, or OBJ C. no because of limited support for this library</a:t>
-            </a:r>
-            <a:r>
-              <a:rPr lang="en-US" baseline="0" dirty="0" smtClean="0">
-                <a:latin typeface="Roboto"/>
-              </a:rPr>
-              <a:t>.</a:t>
+              <a:t>, swift, or OBJ C. no because of limited support for this library.</a:t>
             </a:r>
           </a:p>
           <a:p>
@@ -1551,11 +1541,7 @@
             </a:r>
             <a:r>
               <a:rPr lang="en-US" baseline="0" dirty="0" smtClean="0"/>
-              <a:t> language and is used for rapid web development</a:t>
-            </a:r>
-            <a:r>
-              <a:rPr lang="en-US" baseline="0" dirty="0" smtClean="0"/>
-              <a:t>.</a:t>
+              <a:t> language and is used for rapid web development.</a:t>
             </a:r>
           </a:p>
           <a:p>
@@ -1577,7 +1563,6 @@
               <a:rPr lang="en-US" baseline="0" dirty="0" smtClean="0"/>
               <a:t> starts the server on a default port.</a:t>
             </a:r>
-            <a:endParaRPr lang="en-US" baseline="0" dirty="0" smtClean="0"/>
           </a:p>
           <a:p>
             <a:r>
@@ -1598,12 +1583,63 @@
               <a:rPr lang="en-US" baseline="0" dirty="0" smtClean="0"/>
               <a:t>-Templates is the directory where all of your html goes. </a:t>
             </a:r>
-            <a:endParaRPr lang="en-US" baseline="0" dirty="0" smtClean="0"/>
           </a:p>
           <a:p>
             <a:r>
               <a:rPr lang="en-US" baseline="0" dirty="0" smtClean="0"/>
               <a:t> </a:t>
+            </a:r>
+            <a:endParaRPr lang="en-US" baseline="0" dirty="0" smtClean="0"/>
+          </a:p>
+          <a:p>
+            <a:r>
+              <a:rPr lang="en-US" baseline="0" dirty="0" smtClean="0"/>
+              <a:t>-</a:t>
+            </a:r>
+            <a:r>
+              <a:rPr lang="en-US" baseline="0" dirty="0" err="1" smtClean="0"/>
+              <a:t>GoBuffalo</a:t>
+            </a:r>
+            <a:r>
+              <a:rPr lang="en-US" baseline="0" dirty="0" smtClean="0"/>
+              <a:t> is </a:t>
+            </a:r>
+            <a:r>
+              <a:rPr lang="en-US" baseline="0" dirty="0" err="1" smtClean="0"/>
+              <a:t>golangs</a:t>
+            </a:r>
+            <a:r>
+              <a:rPr lang="en-US" baseline="0" dirty="0" smtClean="0"/>
+              <a:t> version of ruby on rails.</a:t>
+            </a:r>
+          </a:p>
+          <a:p>
+            <a:endParaRPr lang="en-US" baseline="0" dirty="0" smtClean="0"/>
+          </a:p>
+          <a:p>
+            <a:r>
+              <a:rPr lang="en-US" baseline="0" dirty="0" smtClean="0"/>
+              <a:t>Some common commands I wanted to demo is </a:t>
+            </a:r>
+          </a:p>
+          <a:p>
+            <a:r>
+              <a:rPr lang="en-US" baseline="0" dirty="0" smtClean="0"/>
+              <a:t>-buffalo generate  --help // The buffalo generate command will allow you to generate action files, </a:t>
+            </a:r>
+            <a:r>
+              <a:rPr lang="en-US" baseline="0" dirty="0" err="1" smtClean="0"/>
+              <a:t>docker</a:t>
+            </a:r>
+            <a:r>
+              <a:rPr lang="en-US" baseline="0" dirty="0" smtClean="0"/>
+              <a:t> files, and other code files.</a:t>
+            </a:r>
+          </a:p>
+          <a:p>
+            <a:r>
+              <a:rPr lang="en-US" baseline="0" dirty="0" smtClean="0"/>
+              <a:t>-buffalo generate resource //generates models, locales, setups crud pages, and a handler.</a:t>
             </a:r>
             <a:endParaRPr lang="en-US" baseline="0" dirty="0" smtClean="0"/>
           </a:p>
@@ -1912,7 +1948,7 @@
           <a:p>
             <a:fld id="{790ED757-B5C7-4A40-922E-B631E1D33579}" type="datetimeFigureOut">
               <a:rPr lang="en-US" smtClean="0"/>
-              <a:t>5/18/2019</a:t>
+              <a:t>5/19/2019</a:t>
             </a:fld>
             <a:endParaRPr lang="en-US"/>
           </a:p>
@@ -2082,7 +2118,7 @@
           <a:p>
             <a:fld id="{790ED757-B5C7-4A40-922E-B631E1D33579}" type="datetimeFigureOut">
               <a:rPr lang="en-US" smtClean="0"/>
-              <a:t>5/18/2019</a:t>
+              <a:t>5/19/2019</a:t>
             </a:fld>
             <a:endParaRPr lang="en-US"/>
           </a:p>
@@ -2262,7 +2298,7 @@
           <a:p>
             <a:fld id="{790ED757-B5C7-4A40-922E-B631E1D33579}" type="datetimeFigureOut">
               <a:rPr lang="en-US" smtClean="0"/>
-              <a:t>5/18/2019</a:t>
+              <a:t>5/19/2019</a:t>
             </a:fld>
             <a:endParaRPr lang="en-US"/>
           </a:p>
@@ -2432,7 +2468,7 @@
           <a:p>
             <a:fld id="{790ED757-B5C7-4A40-922E-B631E1D33579}" type="datetimeFigureOut">
               <a:rPr lang="en-US" smtClean="0"/>
-              <a:t>5/18/2019</a:t>
+              <a:t>5/19/2019</a:t>
             </a:fld>
             <a:endParaRPr lang="en-US"/>
           </a:p>
@@ -2678,7 +2714,7 @@
           <a:p>
             <a:fld id="{790ED757-B5C7-4A40-922E-B631E1D33579}" type="datetimeFigureOut">
               <a:rPr lang="en-US" smtClean="0"/>
-              <a:t>5/18/2019</a:t>
+              <a:t>5/19/2019</a:t>
             </a:fld>
             <a:endParaRPr lang="en-US"/>
           </a:p>
@@ -2910,7 +2946,7 @@
           <a:p>
             <a:fld id="{790ED757-B5C7-4A40-922E-B631E1D33579}" type="datetimeFigureOut">
               <a:rPr lang="en-US" smtClean="0"/>
-              <a:t>5/18/2019</a:t>
+              <a:t>5/19/2019</a:t>
             </a:fld>
             <a:endParaRPr lang="en-US"/>
           </a:p>
@@ -3277,7 +3313,7 @@
           <a:p>
             <a:fld id="{790ED757-B5C7-4A40-922E-B631E1D33579}" type="datetimeFigureOut">
               <a:rPr lang="en-US" smtClean="0"/>
-              <a:t>5/18/2019</a:t>
+              <a:t>5/19/2019</a:t>
             </a:fld>
             <a:endParaRPr lang="en-US"/>
           </a:p>
@@ -3395,7 +3431,7 @@
           <a:p>
             <a:fld id="{790ED757-B5C7-4A40-922E-B631E1D33579}" type="datetimeFigureOut">
               <a:rPr lang="en-US" smtClean="0"/>
-              <a:t>5/18/2019</a:t>
+              <a:t>5/19/2019</a:t>
             </a:fld>
             <a:endParaRPr lang="en-US"/>
           </a:p>
@@ -3490,7 +3526,7 @@
           <a:p>
             <a:fld id="{790ED757-B5C7-4A40-922E-B631E1D33579}" type="datetimeFigureOut">
               <a:rPr lang="en-US" smtClean="0"/>
-              <a:t>5/18/2019</a:t>
+              <a:t>5/19/2019</a:t>
             </a:fld>
             <a:endParaRPr lang="en-US"/>
           </a:p>
@@ -3767,7 +3803,7 @@
           <a:p>
             <a:fld id="{790ED757-B5C7-4A40-922E-B631E1D33579}" type="datetimeFigureOut">
               <a:rPr lang="en-US" smtClean="0"/>
-              <a:t>5/18/2019</a:t>
+              <a:t>5/19/2019</a:t>
             </a:fld>
             <a:endParaRPr lang="en-US"/>
           </a:p>
@@ -4020,7 +4056,7 @@
           <a:p>
             <a:fld id="{790ED757-B5C7-4A40-922E-B631E1D33579}" type="datetimeFigureOut">
               <a:rPr lang="en-US" smtClean="0"/>
-              <a:t>5/18/2019</a:t>
+              <a:t>5/19/2019</a:t>
             </a:fld>
             <a:endParaRPr lang="en-US"/>
           </a:p>
@@ -4233,7 +4269,7 @@
           <a:p>
             <a:fld id="{790ED757-B5C7-4A40-922E-B631E1D33579}" type="datetimeFigureOut">
               <a:rPr lang="en-US" smtClean="0"/>
-              <a:t>5/18/2019</a:t>
+              <a:t>5/19/2019</a:t>
             </a:fld>
             <a:endParaRPr lang="en-US"/>
           </a:p>
@@ -5724,7 +5760,6 @@
               <a:rPr lang="en-US" dirty="0" smtClean="0"/>
               <a:t>Templates </a:t>
             </a:r>
-            <a:endParaRPr lang="en-US" dirty="0" smtClean="0"/>
           </a:p>
           <a:p>
             <a:r>

</xml_diff>